<commit_message>
42 Lausanne | SANA | 20/12/2023 11:24:49.71
</commit_message>
<xml_diff>
--- a/Presentation/20122023-lab4tech/01 - Presentation IPv6-Start.pptx
+++ b/Presentation/20122023-lab4tech/01 - Presentation IPv6-Start.pptx
@@ -4046,7 +4046,7 @@
                 <a:latin typeface="Arial" panose="020B0604020202020204" pitchFamily="34" charset="0"/>
                 <a:cs typeface="Arial" panose="020B0604020202020204" pitchFamily="34" charset="0"/>
               </a:rPr>
-              <a:t>	IPv6 : 2001:db8:1:1::2/64 	</a:t>
+              <a:t>	IPv6 : 2001:db8:1::4/64 	</a:t>
             </a:r>
             <a:r>
               <a:rPr lang="en-US" b="0" i="0" dirty="0">
@@ -4100,7 +4100,7 @@
                 <a:latin typeface="Arial" panose="020B0604020202020204" pitchFamily="34" charset="0"/>
                 <a:cs typeface="Arial" panose="020B0604020202020204" pitchFamily="34" charset="0"/>
               </a:rPr>
-              <a:t>	IPv6 : 2001:db8:2:1::2/64 	local-link : fe80::1</a:t>
+              <a:t>	IPv6 : 2001:db8:2:1::4/64 	local-link : fe80::1</a:t>
             </a:r>
           </a:p>
           <a:p>

</xml_diff>

<commit_message>
Lab4Tech | L4TVD-PC-17002 | 20240107_1154
</commit_message>
<xml_diff>
--- a/Presentation/20122023-lab4tech/01 - Presentation IPv6-Start.pptx
+++ b/Presentation/20122023-lab4tech/01 - Presentation IPv6-Start.pptx
@@ -5,11 +5,12 @@
     <p:sldMasterId id="2147483648" r:id="rId1"/>
   </p:sldMasterIdLst>
   <p:sldIdLst>
-    <p:sldId id="256" r:id="rId2"/>
-    <p:sldId id="257" r:id="rId3"/>
-    <p:sldId id="258" r:id="rId4"/>
-    <p:sldId id="259" r:id="rId5"/>
-    <p:sldId id="260" r:id="rId6"/>
+    <p:sldId id="261" r:id="rId2"/>
+    <p:sldId id="256" r:id="rId3"/>
+    <p:sldId id="257" r:id="rId4"/>
+    <p:sldId id="258" r:id="rId5"/>
+    <p:sldId id="259" r:id="rId6"/>
+    <p:sldId id="260" r:id="rId7"/>
   </p:sldIdLst>
   <p:sldSz cx="12192000" cy="6858000"/>
   <p:notesSz cx="6858000" cy="9144000"/>
@@ -325,7 +326,7 @@
           <a:p>
             <a:fld id="{B7678559-477A-4E00-8AFD-525895B61900}" type="slidenum">
               <a:rPr lang="fr-FR" smtClean="0"/>
-              <a:t>‹N°›</a:t>
+              <a:t>‹#›</a:t>
             </a:fld>
             <a:endParaRPr lang="fr-FR"/>
           </a:p>
@@ -523,7 +524,7 @@
           <a:p>
             <a:fld id="{B7678559-477A-4E00-8AFD-525895B61900}" type="slidenum">
               <a:rPr lang="fr-FR" smtClean="0"/>
-              <a:t>‹N°›</a:t>
+              <a:t>‹#›</a:t>
             </a:fld>
             <a:endParaRPr lang="fr-FR"/>
           </a:p>
@@ -731,7 +732,7 @@
           <a:p>
             <a:fld id="{B7678559-477A-4E00-8AFD-525895B61900}" type="slidenum">
               <a:rPr lang="fr-FR" smtClean="0"/>
-              <a:t>‹N°›</a:t>
+              <a:t>‹#›</a:t>
             </a:fld>
             <a:endParaRPr lang="fr-FR"/>
           </a:p>
@@ -929,7 +930,7 @@
           <a:p>
             <a:fld id="{B7678559-477A-4E00-8AFD-525895B61900}" type="slidenum">
               <a:rPr lang="fr-FR" smtClean="0"/>
-              <a:t>‹N°›</a:t>
+              <a:t>‹#›</a:t>
             </a:fld>
             <a:endParaRPr lang="fr-FR"/>
           </a:p>
@@ -1204,7 +1205,7 @@
           <a:p>
             <a:fld id="{B7678559-477A-4E00-8AFD-525895B61900}" type="slidenum">
               <a:rPr lang="fr-FR" smtClean="0"/>
-              <a:t>‹N°›</a:t>
+              <a:t>‹#›</a:t>
             </a:fld>
             <a:endParaRPr lang="fr-FR"/>
           </a:p>
@@ -1469,7 +1470,7 @@
           <a:p>
             <a:fld id="{B7678559-477A-4E00-8AFD-525895B61900}" type="slidenum">
               <a:rPr lang="fr-FR" smtClean="0"/>
-              <a:t>‹N°›</a:t>
+              <a:t>‹#›</a:t>
             </a:fld>
             <a:endParaRPr lang="fr-FR"/>
           </a:p>
@@ -1881,7 +1882,7 @@
           <a:p>
             <a:fld id="{B7678559-477A-4E00-8AFD-525895B61900}" type="slidenum">
               <a:rPr lang="fr-FR" smtClean="0"/>
-              <a:t>‹N°›</a:t>
+              <a:t>‹#›</a:t>
             </a:fld>
             <a:endParaRPr lang="fr-FR"/>
           </a:p>
@@ -2022,7 +2023,7 @@
           <a:p>
             <a:fld id="{B7678559-477A-4E00-8AFD-525895B61900}" type="slidenum">
               <a:rPr lang="fr-FR" smtClean="0"/>
-              <a:t>‹N°›</a:t>
+              <a:t>‹#›</a:t>
             </a:fld>
             <a:endParaRPr lang="fr-FR"/>
           </a:p>
@@ -2135,7 +2136,7 @@
           <a:p>
             <a:fld id="{B7678559-477A-4E00-8AFD-525895B61900}" type="slidenum">
               <a:rPr lang="fr-FR" smtClean="0"/>
-              <a:t>‹N°›</a:t>
+              <a:t>‹#›</a:t>
             </a:fld>
             <a:endParaRPr lang="fr-FR"/>
           </a:p>
@@ -2446,7 +2447,7 @@
           <a:p>
             <a:fld id="{B7678559-477A-4E00-8AFD-525895B61900}" type="slidenum">
               <a:rPr lang="fr-FR" smtClean="0"/>
-              <a:t>‹N°›</a:t>
+              <a:t>‹#›</a:t>
             </a:fld>
             <a:endParaRPr lang="fr-FR"/>
           </a:p>
@@ -2734,7 +2735,7 @@
           <a:p>
             <a:fld id="{B7678559-477A-4E00-8AFD-525895B61900}" type="slidenum">
               <a:rPr lang="fr-FR" smtClean="0"/>
-              <a:t>‹N°›</a:t>
+              <a:t>‹#›</a:t>
             </a:fld>
             <a:endParaRPr lang="fr-FR"/>
           </a:p>
@@ -3011,7 +3012,7 @@
           <a:p>
             <a:fld id="{B7678559-477A-4E00-8AFD-525895B61900}" type="slidenum">
               <a:rPr lang="fr-FR" smtClean="0"/>
-              <a:t>‹N°›</a:t>
+              <a:t>‹#›</a:t>
             </a:fld>
             <a:endParaRPr lang="fr-FR"/>
           </a:p>
@@ -3340,34 +3341,22 @@
       </p:grpSpPr>
       <p:pic>
         <p:nvPicPr>
-          <p:cNvPr id="5" name="Image 4" descr="Une image contenant personne, Appareils électroniques, intérieur, texte&#10;&#10;Description générée automatiquement">
-            <a:extLst>
-              <a:ext uri="{FF2B5EF4-FFF2-40B4-BE49-F238E27FC236}">
-                <a16:creationId xmlns:a16="http://schemas.microsoft.com/office/drawing/2014/main" id="{53C494F3-CDAF-152E-A41D-8AB4BFF66FD4}"/>
-              </a:ext>
-            </a:extLst>
-          </p:cNvPr>
+          <p:cNvPr id="4" name="Picture 3"/>
           <p:cNvPicPr>
             <a:picLocks noChangeAspect="1"/>
           </p:cNvPicPr>
           <p:nvPr/>
         </p:nvPicPr>
         <p:blipFill>
-          <a:blip r:embed="rId2">
-            <a:extLst>
-              <a:ext uri="{28A0092B-C50C-407E-A947-70E740481C1C}">
-                <a14:useLocalDpi xmlns:a14="http://schemas.microsoft.com/office/drawing/2010/main" val="0"/>
-              </a:ext>
-            </a:extLst>
-          </a:blip>
+          <a:blip r:embed="rId2"/>
           <a:stretch>
             <a:fillRect/>
           </a:stretch>
         </p:blipFill>
         <p:spPr>
           <a:xfrm>
-            <a:off x="0" y="-547006"/>
-            <a:ext cx="12192000" cy="8125968"/>
+            <a:off x="-1057" y="100760"/>
+            <a:ext cx="12193057" cy="7041490"/>
           </a:xfrm>
           <a:prstGeom prst="rect">
             <a:avLst/>
@@ -3376,24 +3365,18 @@
       </p:pic>
       <p:sp>
         <p:nvSpPr>
-          <p:cNvPr id="2" name="Titre 1">
-            <a:extLst>
-              <a:ext uri="{FF2B5EF4-FFF2-40B4-BE49-F238E27FC236}">
-                <a16:creationId xmlns:a16="http://schemas.microsoft.com/office/drawing/2014/main" id="{CFAE1642-A8DC-2F08-D2E5-8A1C84D885B3}"/>
-              </a:ext>
-            </a:extLst>
-          </p:cNvPr>
-          <p:cNvSpPr>
-            <a:spLocks noGrp="1"/>
-          </p:cNvSpPr>
-          <p:nvPr>
-            <p:ph type="ctrTitle"/>
+          <p:cNvPr id="2" name="Title 1"/>
+          <p:cNvSpPr>
+            <a:spLocks noGrp="1"/>
+          </p:cNvSpPr>
+          <p:nvPr>
+            <p:ph type="title"/>
           </p:nvPr>
         </p:nvSpPr>
         <p:spPr>
           <a:xfrm>
-            <a:off x="96252" y="54142"/>
-            <a:ext cx="7818521" cy="1073568"/>
+            <a:off x="5855369" y="5286088"/>
+            <a:ext cx="10515600" cy="1325563"/>
           </a:xfrm>
         </p:spPr>
         <p:txBody>
@@ -3401,15 +3384,15 @@
           <a:lstStyle/>
           <a:p>
             <a:r>
-              <a:rPr lang="en-US" dirty="0">
+              <a:rPr lang="en-CH" sz="7200" dirty="0" smtClean="0">
                 <a:solidFill>
                   <a:schemeClr val="bg1"/>
                 </a:solidFill>
                 <a:latin typeface="Arial Black" panose="020B0A04020102020204" pitchFamily="34" charset="0"/>
               </a:rPr>
-              <a:t>Introduction IPv6</a:t>
-            </a:r>
-            <a:endParaRPr lang="fr-FR" dirty="0">
+              <a:t>Bienvenue</a:t>
+            </a:r>
+            <a:endParaRPr lang="en-CH" dirty="0">
               <a:solidFill>
                 <a:schemeClr val="bg1"/>
               </a:solidFill>
@@ -3420,108 +3403,32 @@
       </p:sp>
       <p:sp>
         <p:nvSpPr>
-          <p:cNvPr id="3" name="Sous-titre 2">
-            <a:extLst>
-              <a:ext uri="{FF2B5EF4-FFF2-40B4-BE49-F238E27FC236}">
-                <a16:creationId xmlns:a16="http://schemas.microsoft.com/office/drawing/2014/main" id="{FAB06056-3DDD-13AE-6E33-1375932702FC}"/>
-              </a:ext>
-            </a:extLst>
-          </p:cNvPr>
-          <p:cNvSpPr>
-            <a:spLocks noGrp="1"/>
-          </p:cNvSpPr>
-          <p:nvPr>
-            <p:ph type="subTitle" idx="1"/>
+          <p:cNvPr id="3" name="Content Placeholder 2"/>
+          <p:cNvSpPr>
+            <a:spLocks noGrp="1"/>
+          </p:cNvSpPr>
+          <p:nvPr>
+            <p:ph idx="1"/>
           </p:nvPr>
         </p:nvSpPr>
         <p:spPr>
           <a:xfrm>
-            <a:off x="234615" y="3212432"/>
-            <a:ext cx="9976184" cy="3645568"/>
+            <a:off x="1540042" y="7399421"/>
+            <a:ext cx="10499558" cy="4358532"/>
           </a:xfrm>
         </p:spPr>
         <p:txBody>
-          <a:bodyPr>
-            <a:normAutofit/>
-          </a:bodyPr>
-          <a:lstStyle/>
-          <a:p>
-            <a:pPr algn="l"/>
-            <a:r>
-              <a:rPr lang="fr-FR" sz="3200" dirty="0">
-                <a:solidFill>
-                  <a:schemeClr val="bg1"/>
-                </a:solidFill>
-              </a:rPr>
-              <a:t>- Présentation</a:t>
-            </a:r>
-          </a:p>
-          <a:p>
-            <a:pPr algn="l"/>
-            <a:r>
-              <a:rPr lang="fr-FR" sz="3200" dirty="0">
-                <a:solidFill>
-                  <a:schemeClr val="bg1"/>
-                </a:solidFill>
-              </a:rPr>
-              <a:t>- Différence entre IPv4 ou IPv6</a:t>
-            </a:r>
-          </a:p>
-          <a:p>
-            <a:pPr algn="l"/>
-            <a:r>
-              <a:rPr lang="fr-FR" sz="3200" dirty="0">
-                <a:solidFill>
-                  <a:schemeClr val="bg1"/>
-                </a:solidFill>
-              </a:rPr>
-              <a:t>- Configuration d’un router en IPv6 avec </a:t>
-            </a:r>
-            <a:r>
-              <a:rPr lang="fr-FR" sz="3200" dirty="0" err="1">
-                <a:solidFill>
-                  <a:schemeClr val="bg1"/>
-                </a:solidFill>
-              </a:rPr>
-              <a:t>Packet</a:t>
-            </a:r>
-            <a:r>
-              <a:rPr lang="fr-FR" sz="3200" dirty="0">
-                <a:solidFill>
-                  <a:schemeClr val="bg1"/>
-                </a:solidFill>
-              </a:rPr>
-              <a:t> traceur</a:t>
-            </a:r>
-          </a:p>
-          <a:p>
-            <a:pPr algn="l"/>
-            <a:r>
-              <a:rPr lang="fr-FR" sz="3200" dirty="0">
-                <a:solidFill>
-                  <a:schemeClr val="bg1"/>
-                </a:solidFill>
-              </a:rPr>
-              <a:t>- Configuration et test finale du réseau </a:t>
-            </a:r>
-          </a:p>
-          <a:p>
-            <a:pPr algn="l"/>
-            <a:r>
-              <a:rPr lang="fr-FR" sz="3200" dirty="0">
-                <a:solidFill>
-                  <a:schemeClr val="bg1"/>
-                </a:solidFill>
-              </a:rPr>
-              <a:t>- Conclusion et questions</a:t>
-            </a:r>
+          <a:bodyPr/>
+          <a:lstStyle/>
+          <a:p>
+            <a:endParaRPr lang="en-CH" dirty="0"/>
           </a:p>
         </p:txBody>
       </p:sp>
     </p:spTree>
     <p:extLst>
       <p:ext uri="{BB962C8B-B14F-4D97-AF65-F5344CB8AC3E}">
-        <p14:creationId xmlns:p14="http://schemas.microsoft.com/office/powerpoint/2010/main" val="518939545"/>
+        <p14:creationId xmlns:p14="http://schemas.microsoft.com/office/powerpoint/2010/main" val="217661716"/>
       </p:ext>
     </p:extLst>
   </p:cSld>
@@ -3548,139 +3455,182 @@
           <a:chExt cx="0" cy="0"/>
         </a:xfrm>
       </p:grpSpPr>
+      <p:pic>
+        <p:nvPicPr>
+          <p:cNvPr id="5" name="Image 4" descr="Une image contenant personne, Appareils électroniques, intérieur, texte&#10;&#10;Description générée automatiquement">
+            <a:extLst>
+              <a:ext uri="{FF2B5EF4-FFF2-40B4-BE49-F238E27FC236}">
+                <a16:creationId xmlns:a16="http://schemas.microsoft.com/office/drawing/2014/main" id="{53C494F3-CDAF-152E-A41D-8AB4BFF66FD4}"/>
+              </a:ext>
+            </a:extLst>
+          </p:cNvPr>
+          <p:cNvPicPr>
+            <a:picLocks noChangeAspect="1"/>
+          </p:cNvPicPr>
+          <p:nvPr/>
+        </p:nvPicPr>
+        <p:blipFill>
+          <a:blip r:embed="rId2">
+            <a:extLst>
+              <a:ext uri="{28A0092B-C50C-407E-A947-70E740481C1C}">
+                <a14:useLocalDpi xmlns:a14="http://schemas.microsoft.com/office/drawing/2010/main" val="0"/>
+              </a:ext>
+            </a:extLst>
+          </a:blip>
+          <a:stretch>
+            <a:fillRect/>
+          </a:stretch>
+        </p:blipFill>
+        <p:spPr>
+          <a:xfrm>
+            <a:off x="0" y="-547006"/>
+            <a:ext cx="12192000" cy="8125968"/>
+          </a:xfrm>
+          <a:prstGeom prst="rect">
+            <a:avLst/>
+          </a:prstGeom>
+        </p:spPr>
+      </p:pic>
       <p:sp>
         <p:nvSpPr>
           <p:cNvPr id="2" name="Titre 1">
             <a:extLst>
               <a:ext uri="{FF2B5EF4-FFF2-40B4-BE49-F238E27FC236}">
-                <a16:creationId xmlns:a16="http://schemas.microsoft.com/office/drawing/2014/main" id="{36947EFC-7B56-64E4-C354-CC0C2D1EC11F}"/>
-              </a:ext>
-            </a:extLst>
-          </p:cNvPr>
-          <p:cNvSpPr>
-            <a:spLocks noGrp="1"/>
-          </p:cNvSpPr>
-          <p:nvPr>
-            <p:ph type="title"/>
-          </p:nvPr>
-        </p:nvSpPr>
-        <p:spPr/>
-        <p:txBody>
-          <a:bodyPr/>
-          <a:lstStyle/>
-          <a:p>
-            <a:r>
-              <a:rPr lang="fr-FR" b="0" i="0" dirty="0">
+                <a16:creationId xmlns:a16="http://schemas.microsoft.com/office/drawing/2014/main" id="{CFAE1642-A8DC-2F08-D2E5-8A1C84D885B3}"/>
+              </a:ext>
+            </a:extLst>
+          </p:cNvPr>
+          <p:cNvSpPr>
+            <a:spLocks noGrp="1"/>
+          </p:cNvSpPr>
+          <p:nvPr>
+            <p:ph type="ctrTitle"/>
+          </p:nvPr>
+        </p:nvSpPr>
+        <p:spPr>
+          <a:xfrm>
+            <a:off x="96252" y="54142"/>
+            <a:ext cx="7818521" cy="1073568"/>
+          </a:xfrm>
+        </p:spPr>
+        <p:txBody>
+          <a:bodyPr/>
+          <a:lstStyle/>
+          <a:p>
+            <a:r>
+              <a:rPr lang="en-US" dirty="0">
                 <a:solidFill>
-                  <a:srgbClr val="2F3237"/>
+                  <a:schemeClr val="bg1"/>
                 </a:solidFill>
-                <a:effectLst/>
-                <a:latin typeface="LanguageTool-win"/>
+                <a:latin typeface="Arial Black" panose="020B0A04020102020204" pitchFamily="34" charset="0"/>
               </a:rPr>
-              <a:t>Structure d'une adresse IPv6</a:t>
-            </a:r>
-            <a:endParaRPr lang="fr-FR" dirty="0"/>
-          </a:p>
-        </p:txBody>
-      </p:sp>
-      <p:sp>
-        <p:nvSpPr>
-          <p:cNvPr id="3" name="Espace réservé du contenu 2">
-            <a:extLst>
-              <a:ext uri="{FF2B5EF4-FFF2-40B4-BE49-F238E27FC236}">
-                <a16:creationId xmlns:a16="http://schemas.microsoft.com/office/drawing/2014/main" id="{7F030942-C6DD-AF29-21EB-AE681E5311A2}"/>
-              </a:ext>
-            </a:extLst>
-          </p:cNvPr>
-          <p:cNvSpPr>
-            <a:spLocks noGrp="1"/>
-          </p:cNvSpPr>
-          <p:nvPr>
-            <p:ph idx="1"/>
-          </p:nvPr>
-        </p:nvSpPr>
-        <p:spPr/>
-        <p:txBody>
-          <a:bodyPr/>
-          <a:lstStyle/>
-          <a:p>
-            <a:pPr marL="0" indent="0">
-              <a:buNone/>
-            </a:pPr>
-            <a:r>
-              <a:rPr lang="fr-FR" b="0" i="0" dirty="0">
+              <a:t>Introduction IPv6</a:t>
+            </a:r>
+            <a:endParaRPr lang="fr-FR" dirty="0">
+              <a:solidFill>
+                <a:schemeClr val="bg1"/>
+              </a:solidFill>
+              <a:latin typeface="Arial Black" panose="020B0A04020102020204" pitchFamily="34" charset="0"/>
+            </a:endParaRPr>
+          </a:p>
+        </p:txBody>
+      </p:sp>
+      <p:sp>
+        <p:nvSpPr>
+          <p:cNvPr id="3" name="Sous-titre 2">
+            <a:extLst>
+              <a:ext uri="{FF2B5EF4-FFF2-40B4-BE49-F238E27FC236}">
+                <a16:creationId xmlns:a16="http://schemas.microsoft.com/office/drawing/2014/main" id="{FAB06056-3DDD-13AE-6E33-1375932702FC}"/>
+              </a:ext>
+            </a:extLst>
+          </p:cNvPr>
+          <p:cNvSpPr>
+            <a:spLocks noGrp="1"/>
+          </p:cNvSpPr>
+          <p:nvPr>
+            <p:ph type="subTitle" idx="1"/>
+          </p:nvPr>
+        </p:nvSpPr>
+        <p:spPr>
+          <a:xfrm>
+            <a:off x="234615" y="3212432"/>
+            <a:ext cx="9976184" cy="3645568"/>
+          </a:xfrm>
+        </p:spPr>
+        <p:txBody>
+          <a:bodyPr>
+            <a:normAutofit/>
+          </a:bodyPr>
+          <a:lstStyle/>
+          <a:p>
+            <a:pPr algn="l"/>
+            <a:r>
+              <a:rPr lang="fr-FR" sz="3200" dirty="0">
                 <a:solidFill>
-                  <a:srgbClr val="000000"/>
+                  <a:schemeClr val="bg1"/>
                 </a:solidFill>
-                <a:effectLst/>
-                <a:latin typeface="Arial" panose="020B0604020202020204" pitchFamily="34" charset="0"/>
               </a:rPr>
-              <a:t>2001:db8:1:1</a:t>
-            </a:r>
-            <a:r>
-              <a:rPr lang="am-ET" b="0" i="0" dirty="0">
+              <a:t>- Présentation</a:t>
+            </a:r>
+          </a:p>
+          <a:p>
+            <a:pPr algn="l"/>
+            <a:r>
+              <a:rPr lang="fr-FR" sz="3200" dirty="0">
                 <a:solidFill>
-                  <a:srgbClr val="000000"/>
+                  <a:schemeClr val="bg1"/>
                 </a:solidFill>
-                <a:effectLst/>
-                <a:latin typeface="Arial" panose="020B0604020202020204" pitchFamily="34" charset="0"/>
               </a:rPr>
-              <a:t>።1/64</a:t>
-            </a:r>
-            <a:endParaRPr lang="en-US" b="0" i="0" dirty="0">
-              <a:solidFill>
-                <a:srgbClr val="000000"/>
-              </a:solidFill>
-              <a:effectLst/>
-              <a:latin typeface="Arial" panose="020B0604020202020204" pitchFamily="34" charset="0"/>
-            </a:endParaRPr>
-          </a:p>
-          <a:p>
-            <a:r>
-              <a:rPr lang="fr-FR" dirty="0"/>
-              <a:t>Adresse fournit par le « ISP »</a:t>
-            </a:r>
-          </a:p>
-          <a:p>
-            <a:pPr marL="0" indent="0">
-              <a:buNone/>
-            </a:pPr>
-            <a:endParaRPr lang="fr-FR" dirty="0"/>
-          </a:p>
-          <a:p>
-            <a:pPr marL="0" indent="0">
-              <a:buNone/>
-            </a:pPr>
-            <a:r>
-              <a:rPr lang="en-US" dirty="0"/>
-              <a:t>2001:DB8:1:1:207:ECFF:FE29:D35A</a:t>
-            </a:r>
-          </a:p>
-          <a:p>
-            <a:r>
-              <a:rPr lang="fr-FR" dirty="0"/>
-              <a:t>Adresse Complète</a:t>
-            </a:r>
-          </a:p>
-          <a:p>
-            <a:pPr marL="0" indent="0">
-              <a:buNone/>
-            </a:pPr>
-            <a:endParaRPr lang="fr-FR" dirty="0"/>
-          </a:p>
-          <a:p>
-            <a:pPr marL="0" indent="0">
-              <a:buNone/>
-            </a:pPr>
-            <a:r>
-              <a:rPr lang="fr-FR" dirty="0"/>
-              <a:t>fe80::1</a:t>
-            </a:r>
-          </a:p>
-          <a:p>
-            <a:r>
-              <a:rPr lang="fr-FR" dirty="0"/>
-              <a:t>Adresse  de lien local</a:t>
+              <a:t>- Différence entre IPv4 ou IPv6</a:t>
+            </a:r>
+          </a:p>
+          <a:p>
+            <a:pPr algn="l"/>
+            <a:r>
+              <a:rPr lang="fr-FR" sz="3200" dirty="0">
+                <a:solidFill>
+                  <a:schemeClr val="bg1"/>
+                </a:solidFill>
+              </a:rPr>
+              <a:t>- Configuration d’un router en IPv6 avec </a:t>
+            </a:r>
+            <a:r>
+              <a:rPr lang="fr-FR" sz="3200" dirty="0" err="1">
+                <a:solidFill>
+                  <a:schemeClr val="bg1"/>
+                </a:solidFill>
+              </a:rPr>
+              <a:t>Packet</a:t>
+            </a:r>
+            <a:r>
+              <a:rPr lang="fr-FR" sz="3200" dirty="0">
+                <a:solidFill>
+                  <a:schemeClr val="bg1"/>
+                </a:solidFill>
+              </a:rPr>
+              <a:t> traceur</a:t>
+            </a:r>
+          </a:p>
+          <a:p>
+            <a:pPr algn="l"/>
+            <a:r>
+              <a:rPr lang="fr-FR" sz="3200" dirty="0">
+                <a:solidFill>
+                  <a:schemeClr val="bg1"/>
+                </a:solidFill>
+              </a:rPr>
+              <a:t>- Configuration et test finale du réseau </a:t>
+            </a:r>
+          </a:p>
+          <a:p>
+            <a:pPr algn="l"/>
+            <a:r>
+              <a:rPr lang="fr-FR" sz="3200" dirty="0">
+                <a:solidFill>
+                  <a:schemeClr val="bg1"/>
+                </a:solidFill>
+              </a:rPr>
+              <a:t>- Conclusion et questions</a:t>
             </a:r>
           </a:p>
         </p:txBody>
@@ -3688,13 +3638,20 @@
     </p:spTree>
     <p:extLst>
       <p:ext uri="{BB962C8B-B14F-4D97-AF65-F5344CB8AC3E}">
-        <p14:creationId xmlns:p14="http://schemas.microsoft.com/office/powerpoint/2010/main" val="3741782176"/>
+        <p14:creationId xmlns:p14="http://schemas.microsoft.com/office/powerpoint/2010/main" val="518939545"/>
       </p:ext>
     </p:extLst>
   </p:cSld>
   <p:clrMapOvr>
     <a:masterClrMapping/>
   </p:clrMapOvr>
+  <p:timing>
+    <p:tnLst>
+      <p:par>
+        <p:cTn id="1" dur="indefinite" restart="never" nodeType="tmRoot"/>
+      </p:par>
+    </p:tnLst>
+  </p:timing>
 </p:sld>
 </file>
 
@@ -3720,7 +3677,7 @@
           <p:cNvPr id="2" name="Titre 1">
             <a:extLst>
               <a:ext uri="{FF2B5EF4-FFF2-40B4-BE49-F238E27FC236}">
-                <a16:creationId xmlns:a16="http://schemas.microsoft.com/office/drawing/2014/main" id="{F0A66589-518B-E0BB-9B91-74F46718B7C7}"/>
+                <a16:creationId xmlns:a16="http://schemas.microsoft.com/office/drawing/2014/main" id="{36947EFC-7B56-64E4-C354-CC0C2D1EC11F}"/>
               </a:ext>
             </a:extLst>
           </p:cNvPr>
@@ -3737,9 +3694,16 @@
           <a:lstStyle/>
           <a:p>
             <a:r>
-              <a:rPr lang="fr-FR" dirty="0"/>
-              <a:t>Dans le cadre de notre simulation</a:t>
-            </a:r>
+              <a:rPr lang="fr-FR" b="0" i="0" dirty="0">
+                <a:solidFill>
+                  <a:srgbClr val="2F3237"/>
+                </a:solidFill>
+                <a:effectLst/>
+                <a:latin typeface="LanguageTool-win"/>
+              </a:rPr>
+              <a:t>Structure d'une adresse IPv6</a:t>
+            </a:r>
+            <a:endParaRPr lang="fr-FR" dirty="0"/>
           </a:p>
         </p:txBody>
       </p:sp>
@@ -3748,7 +3712,7 @@
           <p:cNvPr id="3" name="Espace réservé du contenu 2">
             <a:extLst>
               <a:ext uri="{FF2B5EF4-FFF2-40B4-BE49-F238E27FC236}">
-                <a16:creationId xmlns:a16="http://schemas.microsoft.com/office/drawing/2014/main" id="{123A75CA-9333-F646-2851-6A9374EB6D47}"/>
+                <a16:creationId xmlns:a16="http://schemas.microsoft.com/office/drawing/2014/main" id="{7F030942-C6DD-AF29-21EB-AE681E5311A2}"/>
               </a:ext>
             </a:extLst>
           </p:cNvPr>
@@ -3761,39 +3725,12 @@
         </p:nvSpPr>
         <p:spPr/>
         <p:txBody>
-          <a:bodyPr>
-            <a:normAutofit/>
-          </a:bodyPr>
+          <a:bodyPr/>
           <a:lstStyle/>
           <a:p>
             <a:pPr marL="0" indent="0">
               <a:buNone/>
             </a:pPr>
-            <a:r>
-              <a:rPr lang="fr-FR" dirty="0">
-                <a:latin typeface="Arial" panose="020B0604020202020204" pitchFamily="34" charset="0"/>
-                <a:cs typeface="Arial" panose="020B0604020202020204" pitchFamily="34" charset="0"/>
-              </a:rPr>
-              <a:t>Configuration du Routeur0</a:t>
-            </a:r>
-          </a:p>
-          <a:p>
-            <a:pPr marL="0" indent="0">
-              <a:buNone/>
-            </a:pPr>
-            <a:endParaRPr lang="fr-FR" dirty="0">
-              <a:latin typeface="Arial" panose="020B0604020202020204" pitchFamily="34" charset="0"/>
-              <a:cs typeface="Arial" panose="020B0604020202020204" pitchFamily="34" charset="0"/>
-            </a:endParaRPr>
-          </a:p>
-          <a:p>
-            <a:r>
-              <a:rPr lang="fr-FR" dirty="0">
-                <a:latin typeface="Arial" panose="020B0604020202020204" pitchFamily="34" charset="0"/>
-                <a:cs typeface="Arial" panose="020B0604020202020204" pitchFamily="34" charset="0"/>
-              </a:rPr>
-              <a:t>G0/0	IP : </a:t>
-            </a:r>
             <a:r>
               <a:rPr lang="fr-FR" b="0" i="0" dirty="0">
                 <a:solidFill>
@@ -3801,7 +3738,6 @@
                 </a:solidFill>
                 <a:effectLst/>
                 <a:latin typeface="Arial" panose="020B0604020202020204" pitchFamily="34" charset="0"/>
-                <a:cs typeface="Arial" panose="020B0604020202020204" pitchFamily="34" charset="0"/>
               </a:rPr>
               <a:t>2001:db8:1:1</a:t>
             </a:r>
@@ -3811,104 +3747,22 @@
                   <a:srgbClr val="000000"/>
                 </a:solidFill>
                 <a:effectLst/>
-                <a:cs typeface="Arial" panose="020B0604020202020204" pitchFamily="34" charset="0"/>
+                <a:latin typeface="Arial" panose="020B0604020202020204" pitchFamily="34" charset="0"/>
               </a:rPr>
               <a:t>።1/64</a:t>
             </a:r>
-            <a:r>
-              <a:rPr lang="en-US" dirty="0">
-                <a:solidFill>
-                  <a:srgbClr val="000000"/>
-                </a:solidFill>
-                <a:latin typeface="Arial" panose="020B0604020202020204" pitchFamily="34" charset="0"/>
-                <a:cs typeface="Arial" panose="020B0604020202020204" pitchFamily="34" charset="0"/>
-              </a:rPr>
-              <a:t>		</a:t>
-            </a:r>
-            <a:r>
-              <a:rPr lang="en-US" b="0" i="0" dirty="0">
-                <a:solidFill>
-                  <a:srgbClr val="000000"/>
-                </a:solidFill>
-                <a:effectLst/>
-                <a:latin typeface="Arial" panose="020B0604020202020204" pitchFamily="34" charset="0"/>
-                <a:cs typeface="Arial" panose="020B0604020202020204" pitchFamily="34" charset="0"/>
-              </a:rPr>
-              <a:t>local-link : fe80::1</a:t>
-            </a:r>
-          </a:p>
-          <a:p>
-            <a:r>
-              <a:rPr lang="fr-FR" dirty="0">
-                <a:latin typeface="Arial" panose="020B0604020202020204" pitchFamily="34" charset="0"/>
-                <a:cs typeface="Arial" panose="020B0604020202020204" pitchFamily="34" charset="0"/>
-              </a:rPr>
-              <a:t>G0/1	IP : </a:t>
-            </a:r>
-            <a:r>
-              <a:rPr lang="fr-FR" b="0" i="0" dirty="0">
-                <a:solidFill>
-                  <a:srgbClr val="000000"/>
-                </a:solidFill>
-                <a:effectLst/>
-                <a:latin typeface="Arial" panose="020B0604020202020204" pitchFamily="34" charset="0"/>
-                <a:cs typeface="Arial" panose="020B0604020202020204" pitchFamily="34" charset="0"/>
-              </a:rPr>
-              <a:t>2001:db8:1:2</a:t>
-            </a:r>
-            <a:r>
-              <a:rPr lang="am-ET" b="0" i="0" dirty="0">
-                <a:solidFill>
-                  <a:srgbClr val="000000"/>
-                </a:solidFill>
-                <a:effectLst/>
-                <a:cs typeface="Arial" panose="020B0604020202020204" pitchFamily="34" charset="0"/>
-              </a:rPr>
-              <a:t>።1/64</a:t>
-            </a:r>
-            <a:r>
-              <a:rPr lang="en-US" b="0" i="0" dirty="0">
-                <a:solidFill>
-                  <a:srgbClr val="000000"/>
-                </a:solidFill>
-                <a:effectLst/>
-                <a:latin typeface="Arial" panose="020B0604020202020204" pitchFamily="34" charset="0"/>
-                <a:cs typeface="Arial" panose="020B0604020202020204" pitchFamily="34" charset="0"/>
-              </a:rPr>
-              <a:t>  	</a:t>
-            </a:r>
-            <a:r>
-              <a:rPr lang="en-US" dirty="0">
-                <a:solidFill>
-                  <a:srgbClr val="000000"/>
-                </a:solidFill>
-                <a:latin typeface="Arial" panose="020B0604020202020204" pitchFamily="34" charset="0"/>
-                <a:cs typeface="Arial" panose="020B0604020202020204" pitchFamily="34" charset="0"/>
-              </a:rPr>
-              <a:t>	</a:t>
-            </a:r>
-            <a:r>
-              <a:rPr lang="en-US" b="0" i="0" dirty="0">
-                <a:solidFill>
-                  <a:srgbClr val="000000"/>
-                </a:solidFill>
-                <a:effectLst/>
-                <a:latin typeface="Arial" panose="020B0604020202020204" pitchFamily="34" charset="0"/>
-                <a:cs typeface="Arial" panose="020B0604020202020204" pitchFamily="34" charset="0"/>
-              </a:rPr>
-              <a:t>local-link : fe80::1</a:t>
-            </a:r>
-          </a:p>
-          <a:p>
-            <a:r>
-              <a:rPr lang="en-US" dirty="0">
-                <a:solidFill>
-                  <a:srgbClr val="000000"/>
-                </a:solidFill>
-                <a:latin typeface="Arial" panose="020B0604020202020204" pitchFamily="34" charset="0"/>
-                <a:cs typeface="Arial" panose="020B0604020202020204" pitchFamily="34" charset="0"/>
-              </a:rPr>
-              <a:t>S0/0/0	IP : 2001:db8:1:a001::2/64 	local-link : fe80::1</a:t>
+            <a:endParaRPr lang="en-US" b="0" i="0" dirty="0">
+              <a:solidFill>
+                <a:srgbClr val="000000"/>
+              </a:solidFill>
+              <a:effectLst/>
+              <a:latin typeface="Arial" panose="020B0604020202020204" pitchFamily="34" charset="0"/>
+            </a:endParaRPr>
+          </a:p>
+          <a:p>
+            <a:r>
+              <a:rPr lang="fr-FR" dirty="0"/>
+              <a:t>Adresse fournit par le « ISP »</a:t>
             </a:r>
           </a:p>
           <a:p>
@@ -3921,20 +3775,57 @@
             <a:pPr marL="0" indent="0">
               <a:buNone/>
             </a:pPr>
+            <a:r>
+              <a:rPr lang="en-US" dirty="0"/>
+              <a:t>2001:DB8:1:1:207:ECFF:FE29:D35A</a:t>
+            </a:r>
+          </a:p>
+          <a:p>
+            <a:r>
+              <a:rPr lang="fr-FR" dirty="0"/>
+              <a:t>Adresse Complète</a:t>
+            </a:r>
+          </a:p>
+          <a:p>
+            <a:pPr marL="0" indent="0">
+              <a:buNone/>
+            </a:pPr>
             <a:endParaRPr lang="fr-FR" dirty="0"/>
+          </a:p>
+          <a:p>
+            <a:pPr marL="0" indent="0">
+              <a:buNone/>
+            </a:pPr>
+            <a:r>
+              <a:rPr lang="fr-FR" dirty="0"/>
+              <a:t>fe80::1</a:t>
+            </a:r>
+          </a:p>
+          <a:p>
+            <a:r>
+              <a:rPr lang="fr-FR" dirty="0"/>
+              <a:t>Adresse  de lien local</a:t>
+            </a:r>
           </a:p>
         </p:txBody>
       </p:sp>
     </p:spTree>
     <p:extLst>
       <p:ext uri="{BB962C8B-B14F-4D97-AF65-F5344CB8AC3E}">
-        <p14:creationId xmlns:p14="http://schemas.microsoft.com/office/powerpoint/2010/main" val="1232546669"/>
+        <p14:creationId xmlns:p14="http://schemas.microsoft.com/office/powerpoint/2010/main" val="3741782176"/>
       </p:ext>
     </p:extLst>
   </p:cSld>
   <p:clrMapOvr>
     <a:masterClrMapping/>
   </p:clrMapOvr>
+  <p:timing>
+    <p:tnLst>
+      <p:par>
+        <p:cTn id="1" dur="indefinite" restart="never" nodeType="tmRoot"/>
+      </p:par>
+    </p:tnLst>
+  </p:timing>
 </p:sld>
 </file>
 
@@ -3960,7 +3851,7 @@
           <p:cNvPr id="2" name="Titre 1">
             <a:extLst>
               <a:ext uri="{FF2B5EF4-FFF2-40B4-BE49-F238E27FC236}">
-                <a16:creationId xmlns:a16="http://schemas.microsoft.com/office/drawing/2014/main" id="{38E1B037-5E83-7AAB-116E-4A67F03A07AA}"/>
+                <a16:creationId xmlns:a16="http://schemas.microsoft.com/office/drawing/2014/main" id="{F0A66589-518B-E0BB-9B91-74F46718B7C7}"/>
               </a:ext>
             </a:extLst>
           </p:cNvPr>
@@ -3977,14 +3868,9 @@
           <a:lstStyle/>
           <a:p>
             <a:r>
-              <a:rPr lang="en-US" dirty="0"/>
-              <a:t>Configuration des </a:t>
-            </a:r>
-            <a:r>
-              <a:rPr lang="en-US" dirty="0" err="1"/>
-              <a:t>Serveurs</a:t>
-            </a:r>
-            <a:endParaRPr lang="fr-FR" dirty="0"/>
+              <a:rPr lang="fr-FR" dirty="0"/>
+              <a:t>Dans le cadre de notre simulation</a:t>
+            </a:r>
           </a:p>
         </p:txBody>
       </p:sp>
@@ -3993,7 +3879,7 @@
           <p:cNvPr id="3" name="Espace réservé du contenu 2">
             <a:extLst>
               <a:ext uri="{FF2B5EF4-FFF2-40B4-BE49-F238E27FC236}">
-                <a16:creationId xmlns:a16="http://schemas.microsoft.com/office/drawing/2014/main" id="{D3636C3F-6EBE-097A-DD9E-9CAC674EEAB7}"/>
+                <a16:creationId xmlns:a16="http://schemas.microsoft.com/office/drawing/2014/main" id="{123A75CA-9333-F646-2851-6A9374EB6D47}"/>
               </a:ext>
             </a:extLst>
           </p:cNvPr>
@@ -4006,47 +3892,69 @@
         </p:nvSpPr>
         <p:spPr/>
         <p:txBody>
-          <a:bodyPr/>
+          <a:bodyPr>
+            <a:normAutofit/>
+          </a:bodyPr>
           <a:lstStyle/>
           <a:p>
             <a:pPr marL="0" indent="0">
               <a:buNone/>
             </a:pPr>
-            <a:endParaRPr lang="en-US" dirty="0"/>
-          </a:p>
-          <a:p>
-            <a:pPr marL="0" indent="0">
-              <a:buNone/>
-            </a:pPr>
-            <a:r>
-              <a:rPr lang="en-US" dirty="0">
+            <a:r>
+              <a:rPr lang="fr-FR" dirty="0">
                 <a:latin typeface="Arial" panose="020B0604020202020204" pitchFamily="34" charset="0"/>
                 <a:cs typeface="Arial" panose="020B0604020202020204" pitchFamily="34" charset="0"/>
               </a:rPr>
-              <a:t>Server </a:t>
-            </a:r>
-            <a:r>
-              <a:rPr lang="en-US" dirty="0" err="1">
+              <a:t>Configuration du Routeur0</a:t>
+            </a:r>
+          </a:p>
+          <a:p>
+            <a:pPr marL="0" indent="0">
+              <a:buNone/>
+            </a:pPr>
+            <a:endParaRPr lang="fr-FR" dirty="0">
+              <a:latin typeface="Arial" panose="020B0604020202020204" pitchFamily="34" charset="0"/>
+              <a:cs typeface="Arial" panose="020B0604020202020204" pitchFamily="34" charset="0"/>
+            </a:endParaRPr>
+          </a:p>
+          <a:p>
+            <a:r>
+              <a:rPr lang="fr-FR" dirty="0">
                 <a:latin typeface="Arial" panose="020B0604020202020204" pitchFamily="34" charset="0"/>
                 <a:cs typeface="Arial" panose="020B0604020202020204" pitchFamily="34" charset="0"/>
               </a:rPr>
-              <a:t>Compta</a:t>
-            </a:r>
-            <a:endParaRPr lang="en-US" dirty="0">
-              <a:latin typeface="Arial" panose="020B0604020202020204" pitchFamily="34" charset="0"/>
-              <a:cs typeface="Arial" panose="020B0604020202020204" pitchFamily="34" charset="0"/>
-            </a:endParaRPr>
-          </a:p>
-          <a:p>
-            <a:pPr marL="0" indent="0">
-              <a:buNone/>
-            </a:pPr>
-            <a:r>
-              <a:rPr lang="en-US" dirty="0">
+              <a:t>G0/0	IP : </a:t>
+            </a:r>
+            <a:r>
+              <a:rPr lang="fr-FR" b="0" i="0" dirty="0">
+                <a:solidFill>
+                  <a:srgbClr val="000000"/>
+                </a:solidFill>
+                <a:effectLst/>
                 <a:latin typeface="Arial" panose="020B0604020202020204" pitchFamily="34" charset="0"/>
                 <a:cs typeface="Arial" panose="020B0604020202020204" pitchFamily="34" charset="0"/>
               </a:rPr>
-              <a:t>	IPv6 : 2001:db8:1::4/64 	</a:t>
+              <a:t>2001:db8:1:1</a:t>
+            </a:r>
+            <a:r>
+              <a:rPr lang="am-ET" b="0" i="0" dirty="0">
+                <a:solidFill>
+                  <a:srgbClr val="000000"/>
+                </a:solidFill>
+                <a:effectLst/>
+                <a:cs typeface="Arial" panose="020B0604020202020204" pitchFamily="34" charset="0"/>
+              </a:rPr>
+              <a:t>።1/64</a:t>
+            </a:r>
+            <a:r>
+              <a:rPr lang="en-US" dirty="0">
+                <a:solidFill>
+                  <a:srgbClr val="000000"/>
+                </a:solidFill>
+                <a:latin typeface="Arial" panose="020B0604020202020204" pitchFamily="34" charset="0"/>
+                <a:cs typeface="Arial" panose="020B0604020202020204" pitchFamily="34" charset="0"/>
+              </a:rPr>
+              <a:t>		</a:t>
             </a:r>
             <a:r>
               <a:rPr lang="en-US" b="0" i="0" dirty="0">
@@ -4061,21 +3969,45 @@
             </a:r>
           </a:p>
           <a:p>
-            <a:pPr marL="0" indent="0">
-              <a:buNone/>
-            </a:pPr>
-            <a:endParaRPr lang="en-US" dirty="0">
-              <a:solidFill>
-                <a:srgbClr val="000000"/>
-              </a:solidFill>
-              <a:latin typeface="Arial" panose="020B0604020202020204" pitchFamily="34" charset="0"/>
-              <a:cs typeface="Arial" panose="020B0604020202020204" pitchFamily="34" charset="0"/>
-            </a:endParaRPr>
-          </a:p>
-          <a:p>
-            <a:pPr marL="0" indent="0">
-              <a:buNone/>
-            </a:pPr>
+            <a:r>
+              <a:rPr lang="fr-FR" dirty="0">
+                <a:latin typeface="Arial" panose="020B0604020202020204" pitchFamily="34" charset="0"/>
+                <a:cs typeface="Arial" panose="020B0604020202020204" pitchFamily="34" charset="0"/>
+              </a:rPr>
+              <a:t>G0/1	IP : </a:t>
+            </a:r>
+            <a:r>
+              <a:rPr lang="fr-FR" b="0" i="0" dirty="0">
+                <a:solidFill>
+                  <a:srgbClr val="000000"/>
+                </a:solidFill>
+                <a:effectLst/>
+                <a:latin typeface="Arial" panose="020B0604020202020204" pitchFamily="34" charset="0"/>
+                <a:cs typeface="Arial" panose="020B0604020202020204" pitchFamily="34" charset="0"/>
+              </a:rPr>
+              <a:t>2001:db8:1:2</a:t>
+            </a:r>
+            <a:r>
+              <a:rPr lang="am-ET" b="0" i="0" dirty="0">
+                <a:solidFill>
+                  <a:srgbClr val="000000"/>
+                </a:solidFill>
+                <a:effectLst/>
+                <a:cs typeface="Arial" panose="020B0604020202020204" pitchFamily="34" charset="0"/>
+              </a:rPr>
+              <a:t>።1/64</a:t>
+            </a:r>
+            <a:r>
+              <a:rPr lang="en-US" b="0" i="0">
+                <a:solidFill>
+                  <a:srgbClr val="000000"/>
+                </a:solidFill>
+                <a:effectLst/>
+                <a:latin typeface="Arial" panose="020B0604020202020204" pitchFamily="34" charset="0"/>
+                <a:cs typeface="Arial" panose="020B0604020202020204" pitchFamily="34" charset="0"/>
+              </a:rPr>
+              <a:t> </a:t>
+            </a:r>
             <a:r>
               <a:rPr lang="en-US" dirty="0">
                 <a:solidFill>
@@ -4084,13 +4016,8 @@
                 <a:latin typeface="Arial" panose="020B0604020202020204" pitchFamily="34" charset="0"/>
                 <a:cs typeface="Arial" panose="020B0604020202020204" pitchFamily="34" charset="0"/>
               </a:rPr>
-              <a:t>Server Production</a:t>
-            </a:r>
-          </a:p>
-          <a:p>
-            <a:pPr marL="0" indent="0">
-              <a:buNone/>
-            </a:pPr>
+              <a:t>	</a:t>
+            </a:r>
             <a:r>
               <a:rPr lang="en-US" b="0" i="0" dirty="0">
                 <a:solidFill>
@@ -4100,40 +4027,26 @@
                 <a:latin typeface="Arial" panose="020B0604020202020204" pitchFamily="34" charset="0"/>
                 <a:cs typeface="Arial" panose="020B0604020202020204" pitchFamily="34" charset="0"/>
               </a:rPr>
-              <a:t>	IPv6 : 2001:db8:2:1::4/64 	local-link : fe80::1</a:t>
+              <a:t>local-link : fe80::1</a:t>
+            </a:r>
+          </a:p>
+          <a:p>
+            <a:r>
+              <a:rPr lang="en-US" dirty="0">
+                <a:solidFill>
+                  <a:srgbClr val="000000"/>
+                </a:solidFill>
+                <a:latin typeface="Arial" panose="020B0604020202020204" pitchFamily="34" charset="0"/>
+                <a:cs typeface="Arial" panose="020B0604020202020204" pitchFamily="34" charset="0"/>
+              </a:rPr>
+              <a:t>S0/0/0	IP : 2001:db8:1:a001::2/64 	local-link : fe80::1</a:t>
             </a:r>
           </a:p>
           <a:p>
             <a:pPr marL="0" indent="0">
               <a:buNone/>
             </a:pPr>
-            <a:endParaRPr lang="en-US" b="0" i="0" dirty="0">
-              <a:solidFill>
-                <a:srgbClr val="000000"/>
-              </a:solidFill>
-              <a:effectLst/>
-              <a:latin typeface="Arial" panose="020B0604020202020204" pitchFamily="34" charset="0"/>
-              <a:cs typeface="Arial" panose="020B0604020202020204" pitchFamily="34" charset="0"/>
-            </a:endParaRPr>
-          </a:p>
-          <a:p>
-            <a:pPr marL="0" indent="0">
-              <a:buNone/>
-            </a:pPr>
-            <a:endParaRPr lang="en-US" b="0" i="0" dirty="0">
-              <a:solidFill>
-                <a:srgbClr val="000000"/>
-              </a:solidFill>
-              <a:effectLst/>
-              <a:latin typeface="Arial" panose="020B0604020202020204" pitchFamily="34" charset="0"/>
-              <a:cs typeface="Arial" panose="020B0604020202020204" pitchFamily="34" charset="0"/>
-            </a:endParaRPr>
-          </a:p>
-          <a:p>
-            <a:pPr marL="0" indent="0">
-              <a:buNone/>
-            </a:pPr>
-            <a:endParaRPr lang="en-US" dirty="0"/>
+            <a:endParaRPr lang="fr-FR" dirty="0"/>
           </a:p>
           <a:p>
             <a:pPr marL="0" indent="0">
@@ -4146,13 +4059,20 @@
     </p:spTree>
     <p:extLst>
       <p:ext uri="{BB962C8B-B14F-4D97-AF65-F5344CB8AC3E}">
-        <p14:creationId xmlns:p14="http://schemas.microsoft.com/office/powerpoint/2010/main" val="3837362887"/>
+        <p14:creationId xmlns:p14="http://schemas.microsoft.com/office/powerpoint/2010/main" val="1232546669"/>
       </p:ext>
     </p:extLst>
   </p:cSld>
   <p:clrMapOvr>
     <a:masterClrMapping/>
   </p:clrMapOvr>
+  <p:timing>
+    <p:tnLst>
+      <p:par>
+        <p:cTn id="1" dur="indefinite" restart="never" nodeType="tmRoot"/>
+      </p:par>
+    </p:tnLst>
+  </p:timing>
 </p:sld>
 </file>
 
@@ -4178,6 +4098,231 @@
           <p:cNvPr id="2" name="Titre 1">
             <a:extLst>
               <a:ext uri="{FF2B5EF4-FFF2-40B4-BE49-F238E27FC236}">
+                <a16:creationId xmlns:a16="http://schemas.microsoft.com/office/drawing/2014/main" id="{38E1B037-5E83-7AAB-116E-4A67F03A07AA}"/>
+              </a:ext>
+            </a:extLst>
+          </p:cNvPr>
+          <p:cNvSpPr>
+            <a:spLocks noGrp="1"/>
+          </p:cNvSpPr>
+          <p:nvPr>
+            <p:ph type="title"/>
+          </p:nvPr>
+        </p:nvSpPr>
+        <p:spPr/>
+        <p:txBody>
+          <a:bodyPr/>
+          <a:lstStyle/>
+          <a:p>
+            <a:r>
+              <a:rPr lang="en-US" dirty="0"/>
+              <a:t>Configuration des </a:t>
+            </a:r>
+            <a:r>
+              <a:rPr lang="en-US" dirty="0" err="1"/>
+              <a:t>Serveurs</a:t>
+            </a:r>
+            <a:endParaRPr lang="fr-FR" dirty="0"/>
+          </a:p>
+        </p:txBody>
+      </p:sp>
+      <p:sp>
+        <p:nvSpPr>
+          <p:cNvPr id="3" name="Espace réservé du contenu 2">
+            <a:extLst>
+              <a:ext uri="{FF2B5EF4-FFF2-40B4-BE49-F238E27FC236}">
+                <a16:creationId xmlns:a16="http://schemas.microsoft.com/office/drawing/2014/main" id="{D3636C3F-6EBE-097A-DD9E-9CAC674EEAB7}"/>
+              </a:ext>
+            </a:extLst>
+          </p:cNvPr>
+          <p:cNvSpPr>
+            <a:spLocks noGrp="1"/>
+          </p:cNvSpPr>
+          <p:nvPr>
+            <p:ph idx="1"/>
+          </p:nvPr>
+        </p:nvSpPr>
+        <p:spPr/>
+        <p:txBody>
+          <a:bodyPr/>
+          <a:lstStyle/>
+          <a:p>
+            <a:pPr marL="0" indent="0">
+              <a:buNone/>
+            </a:pPr>
+            <a:endParaRPr lang="en-US" dirty="0"/>
+          </a:p>
+          <a:p>
+            <a:pPr marL="0" indent="0">
+              <a:buNone/>
+            </a:pPr>
+            <a:r>
+              <a:rPr lang="en-US" dirty="0">
+                <a:latin typeface="Arial" panose="020B0604020202020204" pitchFamily="34" charset="0"/>
+                <a:cs typeface="Arial" panose="020B0604020202020204" pitchFamily="34" charset="0"/>
+              </a:rPr>
+              <a:t>Server </a:t>
+            </a:r>
+            <a:r>
+              <a:rPr lang="en-US" dirty="0" err="1">
+                <a:latin typeface="Arial" panose="020B0604020202020204" pitchFamily="34" charset="0"/>
+                <a:cs typeface="Arial" panose="020B0604020202020204" pitchFamily="34" charset="0"/>
+              </a:rPr>
+              <a:t>Compta</a:t>
+            </a:r>
+            <a:endParaRPr lang="en-US" dirty="0">
+              <a:latin typeface="Arial" panose="020B0604020202020204" pitchFamily="34" charset="0"/>
+              <a:cs typeface="Arial" panose="020B0604020202020204" pitchFamily="34" charset="0"/>
+            </a:endParaRPr>
+          </a:p>
+          <a:p>
+            <a:pPr marL="0" indent="0">
+              <a:buNone/>
+            </a:pPr>
+            <a:r>
+              <a:rPr lang="en-US" dirty="0">
+                <a:latin typeface="Arial" panose="020B0604020202020204" pitchFamily="34" charset="0"/>
+                <a:cs typeface="Arial" panose="020B0604020202020204" pitchFamily="34" charset="0"/>
+              </a:rPr>
+              <a:t>	IPv6 : 2001:db8:1::4/64 	</a:t>
+            </a:r>
+            <a:r>
+              <a:rPr lang="en-US" b="0" i="0" dirty="0">
+                <a:solidFill>
+                  <a:srgbClr val="000000"/>
+                </a:solidFill>
+                <a:effectLst/>
+                <a:latin typeface="Arial" panose="020B0604020202020204" pitchFamily="34" charset="0"/>
+                <a:cs typeface="Arial" panose="020B0604020202020204" pitchFamily="34" charset="0"/>
+              </a:rPr>
+              <a:t>local-link : fe80::1</a:t>
+            </a:r>
+          </a:p>
+          <a:p>
+            <a:pPr marL="0" indent="0">
+              <a:buNone/>
+            </a:pPr>
+            <a:endParaRPr lang="en-US" dirty="0">
+              <a:solidFill>
+                <a:srgbClr val="000000"/>
+              </a:solidFill>
+              <a:latin typeface="Arial" panose="020B0604020202020204" pitchFamily="34" charset="0"/>
+              <a:cs typeface="Arial" panose="020B0604020202020204" pitchFamily="34" charset="0"/>
+            </a:endParaRPr>
+          </a:p>
+          <a:p>
+            <a:pPr marL="0" indent="0">
+              <a:buNone/>
+            </a:pPr>
+            <a:r>
+              <a:rPr lang="en-US" dirty="0">
+                <a:solidFill>
+                  <a:srgbClr val="000000"/>
+                </a:solidFill>
+                <a:latin typeface="Arial" panose="020B0604020202020204" pitchFamily="34" charset="0"/>
+                <a:cs typeface="Arial" panose="020B0604020202020204" pitchFamily="34" charset="0"/>
+              </a:rPr>
+              <a:t>Server Production</a:t>
+            </a:r>
+          </a:p>
+          <a:p>
+            <a:pPr marL="0" indent="0">
+              <a:buNone/>
+            </a:pPr>
+            <a:r>
+              <a:rPr lang="en-US" b="0" i="0" dirty="0">
+                <a:solidFill>
+                  <a:srgbClr val="000000"/>
+                </a:solidFill>
+                <a:effectLst/>
+                <a:latin typeface="Arial" panose="020B0604020202020204" pitchFamily="34" charset="0"/>
+                <a:cs typeface="Arial" panose="020B0604020202020204" pitchFamily="34" charset="0"/>
+              </a:rPr>
+              <a:t>	IPv6 : 2001:db8:2:1::4/64 	local-link : fe80::1</a:t>
+            </a:r>
+          </a:p>
+          <a:p>
+            <a:pPr marL="0" indent="0">
+              <a:buNone/>
+            </a:pPr>
+            <a:endParaRPr lang="en-US" b="0" i="0" dirty="0">
+              <a:solidFill>
+                <a:srgbClr val="000000"/>
+              </a:solidFill>
+              <a:effectLst/>
+              <a:latin typeface="Arial" panose="020B0604020202020204" pitchFamily="34" charset="0"/>
+              <a:cs typeface="Arial" panose="020B0604020202020204" pitchFamily="34" charset="0"/>
+            </a:endParaRPr>
+          </a:p>
+          <a:p>
+            <a:pPr marL="0" indent="0">
+              <a:buNone/>
+            </a:pPr>
+            <a:endParaRPr lang="en-US" b="0" i="0" dirty="0">
+              <a:solidFill>
+                <a:srgbClr val="000000"/>
+              </a:solidFill>
+              <a:effectLst/>
+              <a:latin typeface="Arial" panose="020B0604020202020204" pitchFamily="34" charset="0"/>
+              <a:cs typeface="Arial" panose="020B0604020202020204" pitchFamily="34" charset="0"/>
+            </a:endParaRPr>
+          </a:p>
+          <a:p>
+            <a:pPr marL="0" indent="0">
+              <a:buNone/>
+            </a:pPr>
+            <a:endParaRPr lang="en-US" dirty="0"/>
+          </a:p>
+          <a:p>
+            <a:pPr marL="0" indent="0">
+              <a:buNone/>
+            </a:pPr>
+            <a:endParaRPr lang="fr-FR" dirty="0"/>
+          </a:p>
+        </p:txBody>
+      </p:sp>
+    </p:spTree>
+    <p:extLst>
+      <p:ext uri="{BB962C8B-B14F-4D97-AF65-F5344CB8AC3E}">
+        <p14:creationId xmlns:p14="http://schemas.microsoft.com/office/powerpoint/2010/main" val="3837362887"/>
+      </p:ext>
+    </p:extLst>
+  </p:cSld>
+  <p:clrMapOvr>
+    <a:masterClrMapping/>
+  </p:clrMapOvr>
+  <p:timing>
+    <p:tnLst>
+      <p:par>
+        <p:cTn id="1" dur="indefinite" restart="never" nodeType="tmRoot"/>
+      </p:par>
+    </p:tnLst>
+  </p:timing>
+</p:sld>
+</file>
+
+<file path=ppt/slides/slide6.xml><?xml version="1.0" encoding="utf-8"?>
+<p:sld xmlns:a="http://schemas.openxmlformats.org/drawingml/2006/main" xmlns:r="http://schemas.openxmlformats.org/officeDocument/2006/relationships" xmlns:p="http://schemas.openxmlformats.org/presentationml/2006/main">
+  <p:cSld>
+    <p:spTree>
+      <p:nvGrpSpPr>
+        <p:cNvPr id="1" name=""/>
+        <p:cNvGrpSpPr/>
+        <p:nvPr/>
+      </p:nvGrpSpPr>
+      <p:grpSpPr>
+        <a:xfrm>
+          <a:off x="0" y="0"/>
+          <a:ext cx="0" cy="0"/>
+          <a:chOff x="0" y="0"/>
+          <a:chExt cx="0" cy="0"/>
+        </a:xfrm>
+      </p:grpSpPr>
+      <p:sp>
+        <p:nvSpPr>
+          <p:cNvPr id="2" name="Titre 1">
+            <a:extLst>
+              <a:ext uri="{FF2B5EF4-FFF2-40B4-BE49-F238E27FC236}">
                 <a16:creationId xmlns:a16="http://schemas.microsoft.com/office/drawing/2014/main" id="{A1FFD033-0AC4-05BA-9293-396ACEDC9DF2}"/>
               </a:ext>
             </a:extLst>
@@ -4287,6 +4432,13 @@
   <p:clrMapOvr>
     <a:masterClrMapping/>
   </p:clrMapOvr>
+  <p:timing>
+    <p:tnLst>
+      <p:par>
+        <p:cTn id="1" dur="indefinite" restart="never" nodeType="tmRoot"/>
+      </p:par>
+    </p:tnLst>
+  </p:timing>
 </p:sld>
 </file>
 

</xml_diff>